<commit_message>
Presentation aggiornata, due commenti al codice (VEDI TODO)
</commit_message>
<xml_diff>
--- a/Presentation.pptx
+++ b/Presentation.pptx
@@ -5,7 +5,7 @@
     <p:sldMasterId id="2147483660" r:id="rId1"/>
   </p:sldMasterIdLst>
   <p:notesMasterIdLst>
-    <p:notesMasterId r:id="rId10"/>
+    <p:notesMasterId r:id="rId13"/>
   </p:notesMasterIdLst>
   <p:sldIdLst>
     <p:sldId id="256" r:id="rId2"/>
@@ -15,7 +15,10 @@
     <p:sldId id="281" r:id="rId6"/>
     <p:sldId id="284" r:id="rId7"/>
     <p:sldId id="286" r:id="rId8"/>
-    <p:sldId id="285" r:id="rId9"/>
+    <p:sldId id="287" r:id="rId9"/>
+    <p:sldId id="289" r:id="rId10"/>
+    <p:sldId id="288" r:id="rId11"/>
+    <p:sldId id="285" r:id="rId12"/>
   </p:sldIdLst>
   <p:sldSz cx="9144000" cy="6858000" type="screen4x3"/>
   <p:notesSz cx="6858000" cy="9144000"/>
@@ -3421,6 +3424,319 @@
     <p:extLst>
       <p:ext uri="{BB962C8B-B14F-4D97-AF65-F5344CB8AC3E}">
         <p14:creationId xmlns:p14="http://schemas.microsoft.com/office/powerpoint/2010/main" val="120527830"/>
+      </p:ext>
+    </p:extLst>
+  </p:cSld>
+  <p:clrMapOvr>
+    <a:masterClrMapping/>
+  </p:clrMapOvr>
+</p:sld>
+</file>
+
+<file path=ppt/slides/slide10.xml><?xml version="1.0" encoding="utf-8"?>
+<p:sld xmlns:a="http://schemas.openxmlformats.org/drawingml/2006/main" xmlns:r="http://schemas.openxmlformats.org/officeDocument/2006/relationships" xmlns:p="http://schemas.openxmlformats.org/presentationml/2006/main">
+  <p:cSld>
+    <p:spTree>
+      <p:nvGrpSpPr>
+        <p:cNvPr id="1" name=""/>
+        <p:cNvGrpSpPr/>
+        <p:nvPr/>
+      </p:nvGrpSpPr>
+      <p:grpSpPr>
+        <a:xfrm>
+          <a:off x="0" y="0"/>
+          <a:ext cx="0" cy="0"/>
+          <a:chOff x="0" y="0"/>
+          <a:chExt cx="0" cy="0"/>
+        </a:xfrm>
+      </p:grpSpPr>
+      <p:sp>
+        <p:nvSpPr>
+          <p:cNvPr id="2" name="Title 1"/>
+          <p:cNvSpPr>
+            <a:spLocks noGrp="1"/>
+          </p:cNvSpPr>
+          <p:nvPr>
+            <p:ph type="title"/>
+          </p:nvPr>
+        </p:nvSpPr>
+        <p:spPr>
+          <a:xfrm>
+            <a:off x="344871" y="235819"/>
+            <a:ext cx="7886700" cy="864584"/>
+          </a:xfrm>
+        </p:spPr>
+        <p:txBody>
+          <a:bodyPr/>
+          <a:lstStyle/>
+          <a:p>
+            <a:r>
+              <a:rPr lang="en-GB" dirty="0"/>
+              <a:t>Components: client side</a:t>
+            </a:r>
+          </a:p>
+        </p:txBody>
+      </p:sp>
+      <p:sp>
+        <p:nvSpPr>
+          <p:cNvPr id="3" name="Content Placeholder 2"/>
+          <p:cNvSpPr>
+            <a:spLocks noGrp="1"/>
+          </p:cNvSpPr>
+          <p:nvPr>
+            <p:ph idx="1"/>
+          </p:nvPr>
+        </p:nvSpPr>
+        <p:spPr>
+          <a:xfrm>
+            <a:off x="344871" y="1237045"/>
+            <a:ext cx="8410246" cy="5385136"/>
+          </a:xfrm>
+        </p:spPr>
+        <p:txBody>
+          <a:bodyPr>
+            <a:normAutofit/>
+          </a:bodyPr>
+          <a:lstStyle/>
+          <a:p>
+            <a:r>
+              <a:rPr lang="en-GB" dirty="0" err="1">
+                <a:latin typeface="Courier New" panose="02070309020205020404" pitchFamily="49" charset="0"/>
+                <a:cs typeface="Courier New" panose="02070309020205020404" pitchFamily="49" charset="0"/>
+              </a:rPr>
+              <a:t>Search.html</a:t>
+            </a:r>
+            <a:r>
+              <a:rPr lang="en-GB" dirty="0"/>
+              <a:t>: shows one page of results and possibly the next/previous links</a:t>
+            </a:r>
+          </a:p>
+          <a:p>
+            <a:r>
+              <a:rPr lang="en-GB" dirty="0" err="1">
+                <a:latin typeface="Courier New" panose="02070309020205020404" pitchFamily="49" charset="0"/>
+                <a:cs typeface="Courier New" panose="02070309020205020404" pitchFamily="49" charset="0"/>
+              </a:rPr>
+              <a:t>Photo.html</a:t>
+            </a:r>
+            <a:r>
+              <a:rPr lang="en-GB" dirty="0"/>
+              <a:t>: displays a photo and its collection of tags</a:t>
+            </a:r>
+          </a:p>
+          <a:p>
+            <a:endParaRPr lang="en-GB" dirty="0"/>
+          </a:p>
+        </p:txBody>
+      </p:sp>
+    </p:spTree>
+    <p:extLst>
+      <p:ext uri="{BB962C8B-B14F-4D97-AF65-F5344CB8AC3E}">
+        <p14:creationId xmlns:p14="http://schemas.microsoft.com/office/powerpoint/2010/main" val="3731540885"/>
+      </p:ext>
+    </p:extLst>
+  </p:cSld>
+  <p:clrMapOvr>
+    <a:masterClrMapping/>
+  </p:clrMapOvr>
+</p:sld>
+</file>
+
+<file path=ppt/slides/slide11.xml><?xml version="1.0" encoding="utf-8"?>
+<p:sld xmlns:a="http://schemas.openxmlformats.org/drawingml/2006/main" xmlns:r="http://schemas.openxmlformats.org/officeDocument/2006/relationships" xmlns:p="http://schemas.openxmlformats.org/presentationml/2006/main">
+  <p:cSld>
+    <p:spTree>
+      <p:nvGrpSpPr>
+        <p:cNvPr id="1" name=""/>
+        <p:cNvGrpSpPr/>
+        <p:nvPr/>
+      </p:nvGrpSpPr>
+      <p:grpSpPr>
+        <a:xfrm>
+          <a:off x="0" y="0"/>
+          <a:ext cx="0" cy="0"/>
+          <a:chOff x="0" y="0"/>
+          <a:chExt cx="0" cy="0"/>
+        </a:xfrm>
+      </p:grpSpPr>
+      <p:sp>
+        <p:nvSpPr>
+          <p:cNvPr id="2" name="Title 1"/>
+          <p:cNvSpPr>
+            <a:spLocks noGrp="1"/>
+          </p:cNvSpPr>
+          <p:nvPr>
+            <p:ph type="title"/>
+          </p:nvPr>
+        </p:nvSpPr>
+        <p:spPr/>
+        <p:txBody>
+          <a:bodyPr/>
+          <a:lstStyle/>
+          <a:p>
+            <a:r>
+              <a:rPr lang="en-GB" dirty="0"/>
+              <a:t>Business method for  doing something</a:t>
+            </a:r>
+          </a:p>
+        </p:txBody>
+      </p:sp>
+      <p:sp>
+        <p:nvSpPr>
+          <p:cNvPr id="3" name="Content Placeholder 2"/>
+          <p:cNvSpPr>
+            <a:spLocks noGrp="1"/>
+          </p:cNvSpPr>
+          <p:nvPr>
+            <p:ph idx="1"/>
+          </p:nvPr>
+        </p:nvSpPr>
+        <p:spPr/>
+        <p:txBody>
+          <a:bodyPr>
+            <a:normAutofit/>
+          </a:bodyPr>
+          <a:lstStyle/>
+          <a:p>
+            <a:pPr marL="0" indent="0">
+              <a:buNone/>
+            </a:pPr>
+            <a:r>
+              <a:rPr lang="en-GB" sz="1500" dirty="0">
+                <a:latin typeface="Courier New" panose="02070309020205020404" pitchFamily="49" charset="0"/>
+                <a:cs typeface="Courier New" panose="02070309020205020404" pitchFamily="49" charset="0"/>
+              </a:rPr>
+              <a:t>public void  method(Class </a:t>
+            </a:r>
+            <a:r>
+              <a:rPr lang="en-GB" sz="1500" dirty="0" err="1">
+                <a:latin typeface="Courier New" panose="02070309020205020404" pitchFamily="49" charset="0"/>
+                <a:cs typeface="Courier New" panose="02070309020205020404" pitchFamily="49" charset="0"/>
+              </a:rPr>
+              <a:t>arg</a:t>
+            </a:r>
+            <a:r>
+              <a:rPr lang="en-GB" sz="1500" dirty="0">
+                <a:latin typeface="Courier New" panose="02070309020205020404" pitchFamily="49" charset="0"/>
+                <a:cs typeface="Courier New" panose="02070309020205020404" pitchFamily="49" charset="0"/>
+              </a:rPr>
+              <a:t>, . . .) {</a:t>
+            </a:r>
+          </a:p>
+          <a:p>
+            <a:pPr marL="0" indent="0">
+              <a:buNone/>
+            </a:pPr>
+            <a:endParaRPr lang="en-GB" sz="1500" dirty="0">
+              <a:latin typeface="Courier New" panose="02070309020205020404" pitchFamily="49" charset="0"/>
+              <a:cs typeface="Courier New" panose="02070309020205020404" pitchFamily="49" charset="0"/>
+            </a:endParaRPr>
+          </a:p>
+          <a:p>
+            <a:pPr marL="0" indent="0">
+              <a:buNone/>
+            </a:pPr>
+            <a:r>
+              <a:rPr lang="en-GB" sz="1500" dirty="0">
+                <a:latin typeface="Courier New" panose="02070309020205020404" pitchFamily="49" charset="0"/>
+                <a:cs typeface="Courier New" panose="02070309020205020404" pitchFamily="49" charset="0"/>
+              </a:rPr>
+              <a:t>   // code </a:t>
+            </a:r>
+          </a:p>
+          <a:p>
+            <a:pPr marL="0" indent="0">
+              <a:buNone/>
+            </a:pPr>
+            <a:endParaRPr lang="en-GB" sz="1500" dirty="0">
+              <a:latin typeface="Courier New" panose="02070309020205020404" pitchFamily="49" charset="0"/>
+              <a:cs typeface="Courier New" panose="02070309020205020404" pitchFamily="49" charset="0"/>
+            </a:endParaRPr>
+          </a:p>
+          <a:p>
+            <a:pPr marL="0" indent="0">
+              <a:buNone/>
+            </a:pPr>
+            <a:r>
+              <a:rPr lang="en-GB" sz="1500" dirty="0">
+                <a:latin typeface="Courier New" panose="02070309020205020404" pitchFamily="49" charset="0"/>
+                <a:cs typeface="Courier New" panose="02070309020205020404" pitchFamily="49" charset="0"/>
+              </a:rPr>
+              <a:t>}</a:t>
+            </a:r>
+          </a:p>
+          <a:p>
+            <a:pPr marL="0" indent="0">
+              <a:buNone/>
+            </a:pPr>
+            <a:endParaRPr lang="en-GB" sz="1500" dirty="0">
+              <a:latin typeface="Courier New" panose="02070309020205020404" pitchFamily="49" charset="0"/>
+              <a:cs typeface="Courier New" panose="02070309020205020404" pitchFamily="49" charset="0"/>
+            </a:endParaRPr>
+          </a:p>
+          <a:p>
+            <a:pPr marL="0" indent="0">
+              <a:buNone/>
+            </a:pPr>
+            <a:endParaRPr lang="en-GB" sz="1500" dirty="0">
+              <a:latin typeface="Courier New" panose="02070309020205020404" pitchFamily="49" charset="0"/>
+              <a:cs typeface="Courier New" panose="02070309020205020404" pitchFamily="49" charset="0"/>
+            </a:endParaRPr>
+          </a:p>
+          <a:p>
+            <a:pPr marL="0" indent="0">
+              <a:buNone/>
+            </a:pPr>
+            <a:r>
+              <a:rPr lang="en-GB" sz="1500" dirty="0">
+                <a:latin typeface="Courier New" panose="02070309020205020404" pitchFamily="49" charset="0"/>
+                <a:cs typeface="Courier New" panose="02070309020205020404" pitchFamily="49" charset="0"/>
+              </a:rPr>
+              <a:t>// use if requested</a:t>
+            </a:r>
+          </a:p>
+          <a:p>
+            <a:pPr marL="0" indent="0">
+              <a:buNone/>
+            </a:pPr>
+            <a:r>
+              <a:rPr lang="en-GB" sz="1500" dirty="0">
+                <a:latin typeface="Courier New" panose="02070309020205020404" pitchFamily="49" charset="0"/>
+                <a:cs typeface="Courier New" panose="02070309020205020404" pitchFamily="49" charset="0"/>
+              </a:rPr>
+              <a:t>/* </a:t>
+            </a:r>
+          </a:p>
+          <a:p>
+            <a:pPr marL="0" indent="0">
+              <a:buNone/>
+            </a:pPr>
+            <a:r>
+              <a:rPr lang="en-GB" sz="1500" dirty="0">
+                <a:latin typeface="Courier New" panose="02070309020205020404" pitchFamily="49" charset="0"/>
+                <a:cs typeface="Courier New" panose="02070309020205020404" pitchFamily="49" charset="0"/>
+              </a:rPr>
+              <a:t>clone this slide as many tie as there are requested business methods</a:t>
+            </a:r>
+          </a:p>
+          <a:p>
+            <a:pPr marL="0" indent="0">
+              <a:buNone/>
+            </a:pPr>
+            <a:r>
+              <a:rPr lang="en-GB" sz="1500" dirty="0">
+                <a:latin typeface="Courier New" panose="02070309020205020404" pitchFamily="49" charset="0"/>
+                <a:cs typeface="Courier New" panose="02070309020205020404" pitchFamily="49" charset="0"/>
+              </a:rPr>
+              <a:t>*/</a:t>
+            </a:r>
+          </a:p>
+        </p:txBody>
+      </p:sp>
+    </p:spTree>
+    <p:extLst>
+      <p:ext uri="{BB962C8B-B14F-4D97-AF65-F5344CB8AC3E}">
+        <p14:creationId xmlns:p14="http://schemas.microsoft.com/office/powerpoint/2010/main" val="2072250518"/>
       </p:ext>
     </p:extLst>
   </p:cSld>
@@ -5728,14 +6044,21 @@
             <p:ph type="title"/>
           </p:nvPr>
         </p:nvSpPr>
-        <p:spPr/>
-        <p:txBody>
-          <a:bodyPr/>
-          <a:lstStyle/>
-          <a:p>
-            <a:r>
-              <a:rPr lang="en-GB" dirty="0"/>
-              <a:t>Business method for  doing something</a:t>
+        <p:spPr>
+          <a:xfrm>
+            <a:off x="344871" y="235819"/>
+            <a:ext cx="8294632" cy="864584"/>
+          </a:xfrm>
+        </p:spPr>
+        <p:txBody>
+          <a:bodyPr>
+            <a:noAutofit/>
+          </a:bodyPr>
+          <a:lstStyle/>
+          <a:p>
+            <a:r>
+              <a:rPr lang="en-GB" sz="3200" dirty="0"/>
+              <a:t>Components: client side – login and permissions</a:t>
             </a:r>
           </a:p>
         </p:txBody>
@@ -5750,10 +6073,15 @@
             <p:ph idx="1"/>
           </p:nvPr>
         </p:nvSpPr>
-        <p:spPr/>
+        <p:spPr>
+          <a:xfrm>
+            <a:off x="344871" y="1237045"/>
+            <a:ext cx="8410246" cy="5385136"/>
+          </a:xfrm>
+        </p:spPr>
         <p:txBody>
           <a:bodyPr>
-            <a:normAutofit/>
+            <a:normAutofit fontScale="92500" lnSpcReduction="10000"/>
           </a:bodyPr>
           <a:lstStyle/>
           <a:p>
@@ -5761,53 +6089,56 @@
               <a:buNone/>
             </a:pPr>
             <a:r>
-              <a:rPr lang="en-GB" sz="1500" dirty="0">
-                <a:latin typeface="Courier New" panose="02070309020205020404" pitchFamily="49" charset="0"/>
-                <a:cs typeface="Courier New" panose="02070309020205020404" pitchFamily="49" charset="0"/>
-              </a:rPr>
-              <a:t>public void  method(Class </a:t>
-            </a:r>
-            <a:r>
-              <a:rPr lang="en-GB" sz="1500" dirty="0" err="1">
-                <a:latin typeface="Courier New" panose="02070309020205020404" pitchFamily="49" charset="0"/>
-                <a:cs typeface="Courier New" panose="02070309020205020404" pitchFamily="49" charset="0"/>
-              </a:rPr>
-              <a:t>arg</a:t>
-            </a:r>
-            <a:r>
-              <a:rPr lang="en-GB" sz="1500" dirty="0">
-                <a:latin typeface="Courier New" panose="02070309020205020404" pitchFamily="49" charset="0"/>
-                <a:cs typeface="Courier New" panose="02070309020205020404" pitchFamily="49" charset="0"/>
-              </a:rPr>
-              <a:t>, . . .) {</a:t>
-            </a:r>
-          </a:p>
-          <a:p>
-            <a:pPr marL="0" indent="0">
-              <a:buNone/>
-            </a:pPr>
-            <a:endParaRPr lang="en-GB" sz="1500" dirty="0">
+              <a:rPr lang="en-GB" sz="2200" dirty="0">
+                <a:latin typeface="Courier New" panose="02070309020205020404" pitchFamily="49" charset="0"/>
+                <a:cs typeface="Courier New" panose="02070309020205020404" pitchFamily="49" charset="0"/>
+              </a:rPr>
+              <a:t>SERVLETS</a:t>
+            </a:r>
+          </a:p>
+          <a:p>
+            <a:r>
+              <a:rPr lang="en-GB" sz="2200" dirty="0" err="1">
+                <a:latin typeface="Courier New" panose="02070309020205020404" pitchFamily="49" charset="0"/>
+                <a:cs typeface="Courier New" panose="02070309020205020404" pitchFamily="49" charset="0"/>
+              </a:rPr>
+              <a:t>RegisterUser</a:t>
+            </a:r>
+            <a:r>
+              <a:rPr lang="en-GB" sz="2200" dirty="0"/>
+              <a:t>: register a new user if not already in the database.</a:t>
+            </a:r>
+            <a:endParaRPr lang="en-GB" sz="2200" dirty="0">
               <a:latin typeface="Courier New" panose="02070309020205020404" pitchFamily="49" charset="0"/>
               <a:cs typeface="Courier New" panose="02070309020205020404" pitchFamily="49" charset="0"/>
             </a:endParaRPr>
           </a:p>
           <a:p>
-            <a:pPr marL="0" indent="0">
-              <a:buNone/>
-            </a:pPr>
-            <a:r>
-              <a:rPr lang="en-GB" sz="1500" dirty="0">
-                <a:latin typeface="Courier New" panose="02070309020205020404" pitchFamily="49" charset="0"/>
-                <a:cs typeface="Courier New" panose="02070309020205020404" pitchFamily="49" charset="0"/>
-              </a:rPr>
-              <a:t>   // code </a:t>
-            </a:r>
-          </a:p>
-          <a:p>
-            <a:pPr marL="0" indent="0">
-              <a:buNone/>
-            </a:pPr>
-            <a:endParaRPr lang="en-GB" sz="1500" dirty="0">
+            <a:r>
+              <a:rPr lang="en-GB" sz="2200" dirty="0" err="1">
+                <a:latin typeface="Courier New" panose="02070309020205020404" pitchFamily="49" charset="0"/>
+                <a:cs typeface="Courier New" panose="02070309020205020404" pitchFamily="49" charset="0"/>
+              </a:rPr>
+              <a:t>CheckLogin</a:t>
+            </a:r>
+            <a:r>
+              <a:rPr lang="en-GB" sz="2200" dirty="0"/>
+              <a:t>: validates the content of the login form. It checks the credentials; if the user is an admin redirects to his home page, otherwise, it checks if the account has been blocked and, if not, redirects to the user home page </a:t>
+            </a:r>
+          </a:p>
+          <a:p>
+            <a:r>
+              <a:rPr lang="en-GB" sz="2200" dirty="0">
+                <a:latin typeface="Courier New" panose="02070309020205020404" pitchFamily="49" charset="0"/>
+                <a:cs typeface="Courier New" panose="02070309020205020404" pitchFamily="49" charset="0"/>
+              </a:rPr>
+              <a:t>Logout</a:t>
+            </a:r>
+            <a:r>
+              <a:rPr lang="en-GB" sz="2200" dirty="0"/>
+              <a:t>: logs out the current user and invalidates the session</a:t>
+            </a:r>
+            <a:endParaRPr lang="en-GB" sz="2200" dirty="0">
               <a:latin typeface="Courier New" panose="02070309020205020404" pitchFamily="49" charset="0"/>
               <a:cs typeface="Courier New" panose="02070309020205020404" pitchFamily="49" charset="0"/>
             </a:endParaRPr>
@@ -5816,19 +6147,7 @@
             <a:pPr marL="0" indent="0">
               <a:buNone/>
             </a:pPr>
-            <a:r>
-              <a:rPr lang="en-GB" sz="1500" dirty="0">
-                <a:latin typeface="Courier New" panose="02070309020205020404" pitchFamily="49" charset="0"/>
-                <a:cs typeface="Courier New" panose="02070309020205020404" pitchFamily="49" charset="0"/>
-              </a:rPr>
-              <a:t>}</a:t>
-            </a:r>
-          </a:p>
-          <a:p>
-            <a:pPr marL="0" indent="0">
-              <a:buNone/>
-            </a:pPr>
-            <a:endParaRPr lang="en-GB" sz="1500" dirty="0">
+            <a:endParaRPr lang="en-GB" sz="2200" dirty="0">
               <a:latin typeface="Courier New" panose="02070309020205020404" pitchFamily="49" charset="0"/>
               <a:cs typeface="Courier New" panose="02070309020205020404" pitchFamily="49" charset="0"/>
             </a:endParaRPr>
@@ -5837,65 +6156,420 @@
             <a:pPr marL="0" indent="0">
               <a:buNone/>
             </a:pPr>
-            <a:endParaRPr lang="en-GB" sz="1500" dirty="0">
+            <a:r>
+              <a:rPr lang="en-GB" sz="2200" dirty="0">
+                <a:latin typeface="Courier New" panose="02070309020205020404" pitchFamily="49" charset="0"/>
+                <a:cs typeface="Courier New" panose="02070309020205020404" pitchFamily="49" charset="0"/>
+              </a:rPr>
+              <a:t>FILTERS. </a:t>
+            </a:r>
+            <a:r>
+              <a:rPr lang="en-GB" sz="2200" b="1" dirty="0">
+                <a:latin typeface="Courier New" panose="02070309020205020404" pitchFamily="49" charset="0"/>
+                <a:cs typeface="Courier New" panose="02070309020205020404" pitchFamily="49" charset="0"/>
+              </a:rPr>
+              <a:t>N.B: </a:t>
+            </a:r>
+            <a:r>
+              <a:rPr lang="en-GB" sz="2200" b="1" dirty="0" err="1">
+                <a:latin typeface="Courier New" panose="02070309020205020404" pitchFamily="49" charset="0"/>
+                <a:cs typeface="Courier New" panose="02070309020205020404" pitchFamily="49" charset="0"/>
+              </a:rPr>
+              <a:t>quello</a:t>
+            </a:r>
+            <a:r>
+              <a:rPr lang="en-GB" sz="2200" b="1" dirty="0">
+                <a:latin typeface="Courier New" panose="02070309020205020404" pitchFamily="49" charset="0"/>
+                <a:cs typeface="Courier New" panose="02070309020205020404" pitchFamily="49" charset="0"/>
+              </a:rPr>
+              <a:t> </a:t>
+            </a:r>
+            <a:r>
+              <a:rPr lang="en-GB" sz="2200" b="1" dirty="0" err="1">
+                <a:latin typeface="Courier New" panose="02070309020205020404" pitchFamily="49" charset="0"/>
+                <a:cs typeface="Courier New" panose="02070309020205020404" pitchFamily="49" charset="0"/>
+              </a:rPr>
+              <a:t>che</a:t>
+            </a:r>
+            <a:r>
+              <a:rPr lang="en-GB" sz="2200" b="1" dirty="0">
+                <a:latin typeface="Courier New" panose="02070309020205020404" pitchFamily="49" charset="0"/>
+                <a:cs typeface="Courier New" panose="02070309020205020404" pitchFamily="49" charset="0"/>
+              </a:rPr>
+              <a:t> </a:t>
+            </a:r>
+            <a:r>
+              <a:rPr lang="en-GB" sz="2200" b="1" dirty="0" err="1">
+                <a:latin typeface="Courier New" panose="02070309020205020404" pitchFamily="49" charset="0"/>
+                <a:cs typeface="Courier New" panose="02070309020205020404" pitchFamily="49" charset="0"/>
+              </a:rPr>
+              <a:t>c’è</a:t>
+            </a:r>
+            <a:r>
+              <a:rPr lang="en-GB" sz="2200" b="1" dirty="0">
+                <a:latin typeface="Courier New" panose="02070309020205020404" pitchFamily="49" charset="0"/>
+                <a:cs typeface="Courier New" panose="02070309020205020404" pitchFamily="49" charset="0"/>
+              </a:rPr>
+              <a:t> </a:t>
+            </a:r>
+            <a:r>
+              <a:rPr lang="en-GB" sz="2200" b="1" dirty="0" err="1">
+                <a:latin typeface="Courier New" panose="02070309020205020404" pitchFamily="49" charset="0"/>
+                <a:cs typeface="Courier New" panose="02070309020205020404" pitchFamily="49" charset="0"/>
+              </a:rPr>
+              <a:t>scritto</a:t>
+            </a:r>
+            <a:r>
+              <a:rPr lang="en-GB" sz="2200" b="1" dirty="0">
+                <a:latin typeface="Courier New" panose="02070309020205020404" pitchFamily="49" charset="0"/>
+                <a:cs typeface="Courier New" panose="02070309020205020404" pitchFamily="49" charset="0"/>
+              </a:rPr>
+              <a:t> fa </a:t>
+            </a:r>
+            <a:r>
+              <a:rPr lang="en-GB" sz="2200" b="1" dirty="0" err="1">
+                <a:latin typeface="Courier New" panose="02070309020205020404" pitchFamily="49" charset="0"/>
+                <a:cs typeface="Courier New" panose="02070309020205020404" pitchFamily="49" charset="0"/>
+              </a:rPr>
+              <a:t>riferimento</a:t>
+            </a:r>
+            <a:r>
+              <a:rPr lang="en-GB" sz="2200" b="1" dirty="0">
+                <a:latin typeface="Courier New" panose="02070309020205020404" pitchFamily="49" charset="0"/>
+                <a:cs typeface="Courier New" panose="02070309020205020404" pitchFamily="49" charset="0"/>
+              </a:rPr>
+              <a:t> a dopo </a:t>
+            </a:r>
+            <a:r>
+              <a:rPr lang="en-GB" sz="2200" b="1" dirty="0" err="1">
+                <a:latin typeface="Courier New" panose="02070309020205020404" pitchFamily="49" charset="0"/>
+                <a:cs typeface="Courier New" panose="02070309020205020404" pitchFamily="49" charset="0"/>
+              </a:rPr>
+              <a:t>l’eventuale</a:t>
+            </a:r>
+            <a:r>
+              <a:rPr lang="en-GB" sz="2200" b="1" dirty="0">
+                <a:latin typeface="Courier New" panose="02070309020205020404" pitchFamily="49" charset="0"/>
+                <a:cs typeface="Courier New" panose="02070309020205020404" pitchFamily="49" charset="0"/>
+              </a:rPr>
+              <a:t> </a:t>
+            </a:r>
+            <a:r>
+              <a:rPr lang="en-GB" sz="2200" b="1" dirty="0" err="1">
+                <a:latin typeface="Courier New" panose="02070309020205020404" pitchFamily="49" charset="0"/>
+                <a:cs typeface="Courier New" panose="02070309020205020404" pitchFamily="49" charset="0"/>
+              </a:rPr>
+              <a:t>modifica</a:t>
+            </a:r>
+            <a:r>
+              <a:rPr lang="en-GB" sz="2200" b="1" dirty="0">
+                <a:latin typeface="Courier New" panose="02070309020205020404" pitchFamily="49" charset="0"/>
+                <a:cs typeface="Courier New" panose="02070309020205020404" pitchFamily="49" charset="0"/>
+              </a:rPr>
+              <a:t> ai </a:t>
+            </a:r>
+            <a:r>
+              <a:rPr lang="en-GB" sz="2200" b="1" dirty="0" err="1">
+                <a:latin typeface="Courier New" panose="02070309020205020404" pitchFamily="49" charset="0"/>
+                <a:cs typeface="Courier New" panose="02070309020205020404" pitchFamily="49" charset="0"/>
+              </a:rPr>
+              <a:t>filtri</a:t>
+            </a:r>
+            <a:r>
+              <a:rPr lang="en-GB" sz="2200" b="1" dirty="0">
+                <a:latin typeface="Courier New" panose="02070309020205020404" pitchFamily="49" charset="0"/>
+                <a:cs typeface="Courier New" panose="02070309020205020404" pitchFamily="49" charset="0"/>
+              </a:rPr>
+              <a:t>!!!!!!!</a:t>
+            </a:r>
+          </a:p>
+          <a:p>
+            <a:r>
+              <a:rPr lang="en-GB" sz="2200" dirty="0" err="1">
+                <a:latin typeface="Courier New" panose="02070309020205020404" pitchFamily="49" charset="0"/>
+                <a:cs typeface="Courier New" panose="02070309020205020404" pitchFamily="49" charset="0"/>
+              </a:rPr>
+              <a:t>CheckAdminPrivileges</a:t>
+            </a:r>
+            <a:r>
+              <a:rPr lang="en-GB" sz="2200" dirty="0"/>
+              <a:t>: checks if the logged user is an admin. It applies to all the admin pages</a:t>
+            </a:r>
+            <a:endParaRPr lang="en-GB" sz="2200" dirty="0">
               <a:latin typeface="Courier New" panose="02070309020205020404" pitchFamily="49" charset="0"/>
               <a:cs typeface="Courier New" panose="02070309020205020404" pitchFamily="49" charset="0"/>
             </a:endParaRPr>
           </a:p>
           <a:p>
-            <a:pPr marL="0" indent="0">
-              <a:buNone/>
-            </a:pPr>
-            <a:r>
-              <a:rPr lang="en-GB" sz="1500" dirty="0">
-                <a:latin typeface="Courier New" panose="02070309020205020404" pitchFamily="49" charset="0"/>
-                <a:cs typeface="Courier New" panose="02070309020205020404" pitchFamily="49" charset="0"/>
-              </a:rPr>
-              <a:t>// use if requested</a:t>
-            </a:r>
-          </a:p>
-          <a:p>
-            <a:pPr marL="0" indent="0">
-              <a:buNone/>
-            </a:pPr>
-            <a:r>
-              <a:rPr lang="en-GB" sz="1500" dirty="0">
-                <a:latin typeface="Courier New" panose="02070309020205020404" pitchFamily="49" charset="0"/>
-                <a:cs typeface="Courier New" panose="02070309020205020404" pitchFamily="49" charset="0"/>
-              </a:rPr>
-              <a:t>/* </a:t>
-            </a:r>
-          </a:p>
-          <a:p>
-            <a:pPr marL="0" indent="0">
-              <a:buNone/>
-            </a:pPr>
-            <a:r>
-              <a:rPr lang="en-GB" sz="1500" dirty="0">
-                <a:latin typeface="Courier New" panose="02070309020205020404" pitchFamily="49" charset="0"/>
-                <a:cs typeface="Courier New" panose="02070309020205020404" pitchFamily="49" charset="0"/>
-              </a:rPr>
-              <a:t>clone this slide as many tie as there are requested business methods</a:t>
-            </a:r>
-          </a:p>
-          <a:p>
-            <a:pPr marL="0" indent="0">
-              <a:buNone/>
-            </a:pPr>
-            <a:r>
-              <a:rPr lang="en-GB" sz="1500" dirty="0">
-                <a:latin typeface="Courier New" panose="02070309020205020404" pitchFamily="49" charset="0"/>
-                <a:cs typeface="Courier New" panose="02070309020205020404" pitchFamily="49" charset="0"/>
-              </a:rPr>
-              <a:t>*/</a:t>
-            </a:r>
+            <a:r>
+              <a:rPr lang="en-GB" sz="2200" dirty="0" err="1">
+                <a:latin typeface="Courier New" panose="02070309020205020404" pitchFamily="49" charset="0"/>
+                <a:cs typeface="Courier New" panose="02070309020205020404" pitchFamily="49" charset="0"/>
+              </a:rPr>
+              <a:t>CheckUserPrivileges</a:t>
+            </a:r>
+            <a:r>
+              <a:rPr lang="en-GB" sz="2200" dirty="0"/>
+              <a:t>: checks if the logged user is a normal user (i.e., not an admin). It applies to all the user pages </a:t>
+            </a:r>
+          </a:p>
+          <a:p>
+            <a:r>
+              <a:rPr lang="en-GB" sz="2200" dirty="0" err="1">
+                <a:latin typeface="Courier New" panose="02070309020205020404" pitchFamily="49" charset="0"/>
+                <a:cs typeface="Courier New" panose="02070309020205020404" pitchFamily="49" charset="0"/>
+              </a:rPr>
+              <a:t>LoginFilter</a:t>
+            </a:r>
+            <a:r>
+              <a:rPr lang="en-GB" sz="2200" dirty="0"/>
+              <a:t>: checks if an user has logged in. Applies to all the pages with the exception of the login page</a:t>
+            </a:r>
+            <a:endParaRPr lang="en-GB" sz="2200" dirty="0">
+              <a:latin typeface="Courier New" panose="02070309020205020404" pitchFamily="49" charset="0"/>
+              <a:cs typeface="Courier New" panose="02070309020205020404" pitchFamily="49" charset="0"/>
+            </a:endParaRPr>
           </a:p>
         </p:txBody>
       </p:sp>
     </p:spTree>
     <p:extLst>
       <p:ext uri="{BB962C8B-B14F-4D97-AF65-F5344CB8AC3E}">
-        <p14:creationId xmlns:p14="http://schemas.microsoft.com/office/powerpoint/2010/main" val="2072250518"/>
+        <p14:creationId xmlns:p14="http://schemas.microsoft.com/office/powerpoint/2010/main" val="1498433403"/>
+      </p:ext>
+    </p:extLst>
+  </p:cSld>
+  <p:clrMapOvr>
+    <a:masterClrMapping/>
+  </p:clrMapOvr>
+</p:sld>
+</file>
+
+<file path=ppt/slides/slide9.xml><?xml version="1.0" encoding="utf-8"?>
+<p:sld xmlns:a="http://schemas.openxmlformats.org/drawingml/2006/main" xmlns:r="http://schemas.openxmlformats.org/officeDocument/2006/relationships" xmlns:p="http://schemas.openxmlformats.org/presentationml/2006/main">
+  <p:cSld>
+    <p:spTree>
+      <p:nvGrpSpPr>
+        <p:cNvPr id="1" name=""/>
+        <p:cNvGrpSpPr/>
+        <p:nvPr/>
+      </p:nvGrpSpPr>
+      <p:grpSpPr>
+        <a:xfrm>
+          <a:off x="0" y="0"/>
+          <a:ext cx="0" cy="0"/>
+          <a:chOff x="0" y="0"/>
+          <a:chExt cx="0" cy="0"/>
+        </a:xfrm>
+      </p:grpSpPr>
+      <p:sp>
+        <p:nvSpPr>
+          <p:cNvPr id="2" name="Title 1"/>
+          <p:cNvSpPr>
+            <a:spLocks noGrp="1"/>
+          </p:cNvSpPr>
+          <p:nvPr>
+            <p:ph type="title"/>
+          </p:nvPr>
+        </p:nvSpPr>
+        <p:spPr>
+          <a:xfrm>
+            <a:off x="344871" y="235819"/>
+            <a:ext cx="7886700" cy="864584"/>
+          </a:xfrm>
+        </p:spPr>
+        <p:txBody>
+          <a:bodyPr/>
+          <a:lstStyle/>
+          <a:p>
+            <a:r>
+              <a:rPr lang="en-GB" dirty="0"/>
+              <a:t>Components: client side</a:t>
+            </a:r>
+          </a:p>
+        </p:txBody>
+      </p:sp>
+      <p:sp>
+        <p:nvSpPr>
+          <p:cNvPr id="3" name="Content Placeholder 2"/>
+          <p:cNvSpPr>
+            <a:spLocks noGrp="1"/>
+          </p:cNvSpPr>
+          <p:nvPr>
+            <p:ph idx="1"/>
+          </p:nvPr>
+        </p:nvSpPr>
+        <p:spPr>
+          <a:xfrm>
+            <a:off x="344871" y="1237045"/>
+            <a:ext cx="8410246" cy="5385136"/>
+          </a:xfrm>
+        </p:spPr>
+        <p:txBody>
+          <a:bodyPr>
+            <a:normAutofit fontScale="70000" lnSpcReduction="20000"/>
+          </a:bodyPr>
+          <a:lstStyle/>
+          <a:p>
+            <a:r>
+              <a:rPr lang="en-GB" dirty="0" err="1">
+                <a:latin typeface="Courier New" panose="02070309020205020404" pitchFamily="49" charset="0"/>
+                <a:cs typeface="Courier New" panose="02070309020205020404" pitchFamily="49" charset="0"/>
+              </a:rPr>
+              <a:t>RegisterUser</a:t>
+            </a:r>
+            <a:r>
+              <a:rPr lang="en-GB" dirty="0"/>
+              <a:t>: register a new user if not already in the database.</a:t>
+            </a:r>
+            <a:endParaRPr lang="en-GB" dirty="0">
+              <a:latin typeface="Courier New" panose="02070309020205020404" pitchFamily="49" charset="0"/>
+              <a:cs typeface="Courier New" panose="02070309020205020404" pitchFamily="49" charset="0"/>
+            </a:endParaRPr>
+          </a:p>
+          <a:p>
+            <a:r>
+              <a:rPr lang="en-GB" dirty="0" err="1">
+                <a:latin typeface="Courier New" panose="02070309020205020404" pitchFamily="49" charset="0"/>
+                <a:cs typeface="Courier New" panose="02070309020205020404" pitchFamily="49" charset="0"/>
+              </a:rPr>
+              <a:t>CheckLogin</a:t>
+            </a:r>
+            <a:r>
+              <a:rPr lang="en-GB" dirty="0"/>
+              <a:t>: validates the content of the login form. It checks the credentials; if the user is an admin redirects to his home page, otherwise, it checks if the account has been blocked and, if not, redirects to the user home page </a:t>
+            </a:r>
+          </a:p>
+          <a:p>
+            <a:r>
+              <a:rPr lang="en-GB" dirty="0">
+                <a:latin typeface="Courier New" panose="02070309020205020404" pitchFamily="49" charset="0"/>
+                <a:cs typeface="Courier New" panose="02070309020205020404" pitchFamily="49" charset="0"/>
+              </a:rPr>
+              <a:t>Logout</a:t>
+            </a:r>
+            <a:r>
+              <a:rPr lang="en-GB" dirty="0"/>
+              <a:t>: logs out the current user and invalidates the session</a:t>
+            </a:r>
+            <a:endParaRPr lang="en-GB" dirty="0">
+              <a:latin typeface="Courier New" panose="02070309020205020404" pitchFamily="49" charset="0"/>
+              <a:cs typeface="Courier New" panose="02070309020205020404" pitchFamily="49" charset="0"/>
+            </a:endParaRPr>
+          </a:p>
+          <a:p>
+            <a:r>
+              <a:rPr lang="en-GB" dirty="0" err="1">
+                <a:latin typeface="Courier New" panose="02070309020205020404" pitchFamily="49" charset="0"/>
+                <a:cs typeface="Courier New" panose="02070309020205020404" pitchFamily="49" charset="0"/>
+              </a:rPr>
+              <a:t>GoToUserHomePage</a:t>
+            </a:r>
+            <a:r>
+              <a:rPr lang="en-GB" dirty="0"/>
+              <a:t>: shows the home page of a visitor. It finds the product of the current day and the possible review made by the logged user</a:t>
+            </a:r>
+          </a:p>
+          <a:p>
+            <a:r>
+              <a:rPr lang="en-GB" dirty="0" err="1">
+                <a:latin typeface="Courier New" panose="02070309020205020404" pitchFamily="49" charset="0"/>
+                <a:cs typeface="Courier New" panose="02070309020205020404" pitchFamily="49" charset="0"/>
+              </a:rPr>
+              <a:t>GoToAdminHomePage</a:t>
+            </a:r>
+            <a:r>
+              <a:rPr lang="en-GB" dirty="0"/>
+              <a:t>: shows the home page of an administrator</a:t>
+            </a:r>
+            <a:endParaRPr lang="en-GB" dirty="0">
+              <a:latin typeface="Courier New" panose="02070309020205020404" pitchFamily="49" charset="0"/>
+              <a:cs typeface="Courier New" panose="02070309020205020404" pitchFamily="49" charset="0"/>
+            </a:endParaRPr>
+          </a:p>
+          <a:p>
+            <a:r>
+              <a:rPr lang="en-GB" dirty="0" err="1">
+                <a:latin typeface="Courier New" panose="02070309020205020404" pitchFamily="49" charset="0"/>
+                <a:cs typeface="Courier New" panose="02070309020205020404" pitchFamily="49" charset="0"/>
+              </a:rPr>
+              <a:t>GoToLeaderboardPage</a:t>
+            </a:r>
+            <a:r>
+              <a:rPr lang="en-GB" dirty="0"/>
+              <a:t>: shows the </a:t>
+            </a:r>
+            <a:r>
+              <a:rPr lang="en-GB" dirty="0" err="1"/>
+              <a:t>leaderboard</a:t>
+            </a:r>
+            <a:r>
+              <a:rPr lang="en-GB" dirty="0"/>
+              <a:t> page</a:t>
+            </a:r>
+          </a:p>
+          <a:p>
+            <a:r>
+              <a:rPr lang="en-GB" dirty="0" err="1">
+                <a:latin typeface="Courier New" panose="02070309020205020404" pitchFamily="49" charset="0"/>
+                <a:cs typeface="Courier New" panose="02070309020205020404" pitchFamily="49" charset="0"/>
+              </a:rPr>
+              <a:t>GoToNewReviewPage</a:t>
+            </a:r>
+            <a:r>
+              <a:rPr lang="en-GB" dirty="0"/>
+              <a:t>: shows the first page of the review creation process for the product of the current day</a:t>
+            </a:r>
+          </a:p>
+          <a:p>
+            <a:r>
+              <a:rPr lang="en-GB" dirty="0">
+                <a:latin typeface="Courier New" panose="02070309020205020404" pitchFamily="49" charset="0"/>
+                <a:cs typeface="Courier New" panose="02070309020205020404" pitchFamily="49" charset="0"/>
+              </a:rPr>
+              <a:t>GoToNewReview2ndPage</a:t>
+            </a:r>
+            <a:r>
+              <a:rPr lang="en-GB" dirty="0"/>
+              <a:t>: shows the second page of the review creation process for the product of the current day</a:t>
+            </a:r>
+          </a:p>
+          <a:p>
+            <a:r>
+              <a:rPr lang="en-GB" dirty="0" err="1">
+                <a:latin typeface="Courier New" panose="02070309020205020404" pitchFamily="49" charset="0"/>
+                <a:cs typeface="Courier New" panose="02070309020205020404" pitchFamily="49" charset="0"/>
+              </a:rPr>
+              <a:t>SaveReview</a:t>
+            </a:r>
+            <a:r>
+              <a:rPr lang="en-GB" dirty="0"/>
+              <a:t>: completes the review creation process by saving the review. It also blocks the logged user if he used offensive words in the review (and in that case the review is not saved)</a:t>
+            </a:r>
+          </a:p>
+          <a:p>
+            <a:r>
+              <a:rPr lang="en-GB" dirty="0" err="1">
+                <a:latin typeface="Courier New" panose="02070309020205020404" pitchFamily="49" charset="0"/>
+                <a:cs typeface="Courier New" panose="02070309020205020404" pitchFamily="49" charset="0"/>
+              </a:rPr>
+              <a:t>DeleteReview</a:t>
+            </a:r>
+            <a:r>
+              <a:rPr lang="en-GB" dirty="0"/>
+              <a:t>: deletes the review made by the logged user for the product of the current day</a:t>
+            </a:r>
+            <a:endParaRPr lang="en-GB" dirty="0">
+              <a:latin typeface="Courier New" panose="02070309020205020404" pitchFamily="49" charset="0"/>
+              <a:cs typeface="Courier New" panose="02070309020205020404" pitchFamily="49" charset="0"/>
+            </a:endParaRPr>
+          </a:p>
+        </p:txBody>
+      </p:sp>
+    </p:spTree>
+    <p:extLst>
+      <p:ext uri="{BB962C8B-B14F-4D97-AF65-F5344CB8AC3E}">
+        <p14:creationId xmlns:p14="http://schemas.microsoft.com/office/powerpoint/2010/main" val="4161589973"/>
       </p:ext>
     </p:extLst>
   </p:cSld>

</xml_diff>